<commit_message>
another branch to try things out
</commit_message>
<xml_diff>
--- a/ideation_docs/crowd-voting-cards-against-humanity-wireframe-template.pptx
+++ b/ideation_docs/crowd-voting-cards-against-humanity-wireframe-template.pptx
@@ -216,7 +216,7 @@
           <a:p>
             <a:fld id="{79B88A7B-0B1A-4D17-B72A-7A7FB5F40518}" type="datetimeFigureOut">
               <a:rPr lang="en-US" smtClean="0"/>
-              <a:t>3/11/22</a:t>
+              <a:t>3/28/22</a:t>
             </a:fld>
             <a:endParaRPr lang="en-US"/>
           </a:p>
@@ -662,7 +662,7 @@
           <a:p>
             <a:fld id="{CB9E878C-2893-43F5-80FA-AA32212D425A}" type="datetimeFigureOut">
               <a:rPr lang="en-US" smtClean="0"/>
-              <a:t>3/11/22</a:t>
+              <a:t>3/28/22</a:t>
             </a:fld>
             <a:endParaRPr lang="en-US"/>
           </a:p>
@@ -830,7 +830,7 @@
           <a:p>
             <a:fld id="{CB9E878C-2893-43F5-80FA-AA32212D425A}" type="datetimeFigureOut">
               <a:rPr lang="en-US" smtClean="0"/>
-              <a:t>3/11/22</a:t>
+              <a:t>3/28/22</a:t>
             </a:fld>
             <a:endParaRPr lang="en-US"/>
           </a:p>
@@ -1008,7 +1008,7 @@
           <a:p>
             <a:fld id="{CB9E878C-2893-43F5-80FA-AA32212D425A}" type="datetimeFigureOut">
               <a:rPr lang="en-US" smtClean="0"/>
-              <a:t>3/11/22</a:t>
+              <a:t>3/28/22</a:t>
             </a:fld>
             <a:endParaRPr lang="en-US"/>
           </a:p>
@@ -1176,7 +1176,7 @@
           <a:p>
             <a:fld id="{CB9E878C-2893-43F5-80FA-AA32212D425A}" type="datetimeFigureOut">
               <a:rPr lang="en-US" smtClean="0"/>
-              <a:t>3/11/22</a:t>
+              <a:t>3/28/22</a:t>
             </a:fld>
             <a:endParaRPr lang="en-US"/>
           </a:p>
@@ -1421,7 +1421,7 @@
           <a:p>
             <a:fld id="{CB9E878C-2893-43F5-80FA-AA32212D425A}" type="datetimeFigureOut">
               <a:rPr lang="en-US" smtClean="0"/>
-              <a:t>3/11/22</a:t>
+              <a:t>3/28/22</a:t>
             </a:fld>
             <a:endParaRPr lang="en-US"/>
           </a:p>
@@ -1706,7 +1706,7 @@
           <a:p>
             <a:fld id="{CB9E878C-2893-43F5-80FA-AA32212D425A}" type="datetimeFigureOut">
               <a:rPr lang="en-US" smtClean="0"/>
-              <a:t>3/11/22</a:t>
+              <a:t>3/28/22</a:t>
             </a:fld>
             <a:endParaRPr lang="en-US"/>
           </a:p>
@@ -2125,7 +2125,7 @@
           <a:p>
             <a:fld id="{CB9E878C-2893-43F5-80FA-AA32212D425A}" type="datetimeFigureOut">
               <a:rPr lang="en-US" smtClean="0"/>
-              <a:t>3/11/22</a:t>
+              <a:t>3/28/22</a:t>
             </a:fld>
             <a:endParaRPr lang="en-US"/>
           </a:p>
@@ -2242,7 +2242,7 @@
           <a:p>
             <a:fld id="{CB9E878C-2893-43F5-80FA-AA32212D425A}" type="datetimeFigureOut">
               <a:rPr lang="en-US" smtClean="0"/>
-              <a:t>3/11/22</a:t>
+              <a:t>3/28/22</a:t>
             </a:fld>
             <a:endParaRPr lang="en-US"/>
           </a:p>
@@ -2337,7 +2337,7 @@
           <a:p>
             <a:fld id="{CB9E878C-2893-43F5-80FA-AA32212D425A}" type="datetimeFigureOut">
               <a:rPr lang="en-US" smtClean="0"/>
-              <a:t>3/11/22</a:t>
+              <a:t>3/28/22</a:t>
             </a:fld>
             <a:endParaRPr lang="en-US"/>
           </a:p>
@@ -2612,7 +2612,7 @@
           <a:p>
             <a:fld id="{CB9E878C-2893-43F5-80FA-AA32212D425A}" type="datetimeFigureOut">
               <a:rPr lang="en-US" smtClean="0"/>
-              <a:t>3/11/22</a:t>
+              <a:t>3/28/22</a:t>
             </a:fld>
             <a:endParaRPr lang="en-US"/>
           </a:p>
@@ -2864,7 +2864,7 @@
           <a:p>
             <a:fld id="{CB9E878C-2893-43F5-80FA-AA32212D425A}" type="datetimeFigureOut">
               <a:rPr lang="en-US" smtClean="0"/>
-              <a:t>3/11/22</a:t>
+              <a:t>3/28/22</a:t>
             </a:fld>
             <a:endParaRPr lang="en-US"/>
           </a:p>
@@ -3075,7 +3075,7 @@
           <a:p>
             <a:fld id="{CB9E878C-2893-43F5-80FA-AA32212D425A}" type="datetimeFigureOut">
               <a:rPr lang="en-US" smtClean="0"/>
-              <a:t>3/11/22</a:t>
+              <a:t>3/28/22</a:t>
             </a:fld>
             <a:endParaRPr lang="en-US"/>
           </a:p>

</xml_diff>